<commit_message>
Anforderungskatalog and Anbieterprofile done; done with UE2!
</commit_message>
<xml_diff>
--- a/UE2/Anbieterprofile.pptx
+++ b/UE2/Anbieterprofile.pptx
@@ -10,7 +10,11 @@
     <p:sldId id="258" r:id="rId4"/>
     <p:sldId id="259" r:id="rId5"/>
     <p:sldId id="260" r:id="rId6"/>
-    <p:sldId id="261" r:id="rId7"/>
+    <p:sldId id="262" r:id="rId7"/>
+    <p:sldId id="263" r:id="rId8"/>
+    <p:sldId id="261" r:id="rId9"/>
+    <p:sldId id="264" r:id="rId10"/>
+    <p:sldId id="265" r:id="rId11"/>
   </p:sldIdLst>
   <p:sldSz cx="9144000" cy="6858000" type="screen4x3"/>
   <p:notesSz cx="6858000" cy="9144000"/>
@@ -285,7 +289,7 @@
           <a:p>
             <a:fld id="{003DD14B-5EBE-4F83-97D8-336A1B5735EB}" type="datetimeFigureOut">
               <a:rPr lang="de-AT" smtClean="0"/>
-              <a:t>17.01.2014</a:t>
+              <a:t>19.01.2014</a:t>
             </a:fld>
             <a:endParaRPr lang="de-AT"/>
           </a:p>
@@ -327,7 +331,7 @@
           <a:p>
             <a:fld id="{18D97213-2954-44C4-8C70-7D9E680F965F}" type="slidenum">
               <a:rPr lang="de-AT" smtClean="0"/>
-              <a:t>‹Nr.›</a:t>
+              <a:t>‹#›</a:t>
             </a:fld>
             <a:endParaRPr lang="de-AT"/>
           </a:p>
@@ -450,7 +454,7 @@
           <a:p>
             <a:fld id="{003DD14B-5EBE-4F83-97D8-336A1B5735EB}" type="datetimeFigureOut">
               <a:rPr lang="de-AT" smtClean="0"/>
-              <a:t>17.01.2014</a:t>
+              <a:t>19.01.2014</a:t>
             </a:fld>
             <a:endParaRPr lang="de-AT"/>
           </a:p>
@@ -492,7 +496,7 @@
           <a:p>
             <a:fld id="{18D97213-2954-44C4-8C70-7D9E680F965F}" type="slidenum">
               <a:rPr lang="de-AT" smtClean="0"/>
-              <a:t>‹Nr.›</a:t>
+              <a:t>‹#›</a:t>
             </a:fld>
             <a:endParaRPr lang="de-AT"/>
           </a:p>
@@ -625,7 +629,7 @@
           <a:p>
             <a:fld id="{003DD14B-5EBE-4F83-97D8-336A1B5735EB}" type="datetimeFigureOut">
               <a:rPr lang="de-AT" smtClean="0"/>
-              <a:t>17.01.2014</a:t>
+              <a:t>19.01.2014</a:t>
             </a:fld>
             <a:endParaRPr lang="de-AT"/>
           </a:p>
@@ -667,7 +671,7 @@
           <a:p>
             <a:fld id="{18D97213-2954-44C4-8C70-7D9E680F965F}" type="slidenum">
               <a:rPr lang="de-AT" smtClean="0"/>
-              <a:t>‹Nr.›</a:t>
+              <a:t>‹#›</a:t>
             </a:fld>
             <a:endParaRPr lang="de-AT"/>
           </a:p>
@@ -790,7 +794,7 @@
           <a:p>
             <a:fld id="{003DD14B-5EBE-4F83-97D8-336A1B5735EB}" type="datetimeFigureOut">
               <a:rPr lang="de-AT" smtClean="0"/>
-              <a:t>17.01.2014</a:t>
+              <a:t>19.01.2014</a:t>
             </a:fld>
             <a:endParaRPr lang="de-AT"/>
           </a:p>
@@ -832,7 +836,7 @@
           <a:p>
             <a:fld id="{18D97213-2954-44C4-8C70-7D9E680F965F}" type="slidenum">
               <a:rPr lang="de-AT" smtClean="0"/>
-              <a:t>‹Nr.›</a:t>
+              <a:t>‹#›</a:t>
             </a:fld>
             <a:endParaRPr lang="de-AT"/>
           </a:p>
@@ -1032,7 +1036,7 @@
           <a:p>
             <a:fld id="{003DD14B-5EBE-4F83-97D8-336A1B5735EB}" type="datetimeFigureOut">
               <a:rPr lang="de-AT" smtClean="0"/>
-              <a:t>17.01.2014</a:t>
+              <a:t>19.01.2014</a:t>
             </a:fld>
             <a:endParaRPr lang="de-AT"/>
           </a:p>
@@ -1074,7 +1078,7 @@
           <a:p>
             <a:fld id="{18D97213-2954-44C4-8C70-7D9E680F965F}" type="slidenum">
               <a:rPr lang="de-AT" smtClean="0"/>
-              <a:t>‹Nr.›</a:t>
+              <a:t>‹#›</a:t>
             </a:fld>
             <a:endParaRPr lang="de-AT"/>
           </a:p>
@@ -1296,7 +1300,7 @@
           <a:p>
             <a:fld id="{003DD14B-5EBE-4F83-97D8-336A1B5735EB}" type="datetimeFigureOut">
               <a:rPr lang="de-AT" smtClean="0"/>
-              <a:t>17.01.2014</a:t>
+              <a:t>19.01.2014</a:t>
             </a:fld>
             <a:endParaRPr lang="de-AT"/>
           </a:p>
@@ -1338,7 +1342,7 @@
           <a:p>
             <a:fld id="{18D97213-2954-44C4-8C70-7D9E680F965F}" type="slidenum">
               <a:rPr lang="de-AT" smtClean="0"/>
-              <a:t>‹Nr.›</a:t>
+              <a:t>‹#›</a:t>
             </a:fld>
             <a:endParaRPr lang="de-AT"/>
           </a:p>
@@ -1674,7 +1678,7 @@
           <a:p>
             <a:fld id="{003DD14B-5EBE-4F83-97D8-336A1B5735EB}" type="datetimeFigureOut">
               <a:rPr lang="de-AT" smtClean="0"/>
-              <a:t>17.01.2014</a:t>
+              <a:t>19.01.2014</a:t>
             </a:fld>
             <a:endParaRPr lang="de-AT"/>
           </a:p>
@@ -1716,7 +1720,7 @@
           <a:p>
             <a:fld id="{18D97213-2954-44C4-8C70-7D9E680F965F}" type="slidenum">
               <a:rPr lang="de-AT" smtClean="0"/>
-              <a:t>‹Nr.›</a:t>
+              <a:t>‹#›</a:t>
             </a:fld>
             <a:endParaRPr lang="de-AT"/>
           </a:p>
@@ -1824,7 +1828,7 @@
           <a:p>
             <a:fld id="{003DD14B-5EBE-4F83-97D8-336A1B5735EB}" type="datetimeFigureOut">
               <a:rPr lang="de-AT" smtClean="0"/>
-              <a:t>17.01.2014</a:t>
+              <a:t>19.01.2014</a:t>
             </a:fld>
             <a:endParaRPr lang="de-AT"/>
           </a:p>
@@ -1866,7 +1870,7 @@
           <a:p>
             <a:fld id="{18D97213-2954-44C4-8C70-7D9E680F965F}" type="slidenum">
               <a:rPr lang="de-AT" smtClean="0"/>
-              <a:t>‹Nr.›</a:t>
+              <a:t>‹#›</a:t>
             </a:fld>
             <a:endParaRPr lang="de-AT"/>
           </a:p>
@@ -1914,7 +1918,7 @@
           <a:p>
             <a:fld id="{003DD14B-5EBE-4F83-97D8-336A1B5735EB}" type="datetimeFigureOut">
               <a:rPr lang="de-AT" smtClean="0"/>
-              <a:t>17.01.2014</a:t>
+              <a:t>19.01.2014</a:t>
             </a:fld>
             <a:endParaRPr lang="de-AT"/>
           </a:p>
@@ -1956,7 +1960,7 @@
           <a:p>
             <a:fld id="{18D97213-2954-44C4-8C70-7D9E680F965F}" type="slidenum">
               <a:rPr lang="de-AT" smtClean="0"/>
-              <a:t>‹Nr.›</a:t>
+              <a:t>‹#›</a:t>
             </a:fld>
             <a:endParaRPr lang="de-AT"/>
           </a:p>
@@ -2175,7 +2179,7 @@
           <a:p>
             <a:fld id="{003DD14B-5EBE-4F83-97D8-336A1B5735EB}" type="datetimeFigureOut">
               <a:rPr lang="de-AT" smtClean="0"/>
-              <a:t>17.01.2014</a:t>
+              <a:t>19.01.2014</a:t>
             </a:fld>
             <a:endParaRPr lang="de-AT"/>
           </a:p>
@@ -2217,7 +2221,7 @@
           <a:p>
             <a:fld id="{18D97213-2954-44C4-8C70-7D9E680F965F}" type="slidenum">
               <a:rPr lang="de-AT" smtClean="0"/>
-              <a:t>‹Nr.›</a:t>
+              <a:t>‹#›</a:t>
             </a:fld>
             <a:endParaRPr lang="de-AT"/>
           </a:p>
@@ -2463,7 +2467,7 @@
           <a:p>
             <a:fld id="{003DD14B-5EBE-4F83-97D8-336A1B5735EB}" type="datetimeFigureOut">
               <a:rPr lang="de-AT" smtClean="0"/>
-              <a:t>17.01.2014</a:t>
+              <a:t>19.01.2014</a:t>
             </a:fld>
             <a:endParaRPr lang="de-AT"/>
           </a:p>
@@ -2510,7 +2514,7 @@
           <a:p>
             <a:fld id="{18D97213-2954-44C4-8C70-7D9E680F965F}" type="slidenum">
               <a:rPr lang="de-AT" smtClean="0"/>
-              <a:t>‹Nr.›</a:t>
+              <a:t>‹#›</a:t>
             </a:fld>
             <a:endParaRPr lang="de-AT"/>
           </a:p>
@@ -3234,7 +3238,7 @@
           <a:p>
             <a:fld id="{003DD14B-5EBE-4F83-97D8-336A1B5735EB}" type="datetimeFigureOut">
               <a:rPr lang="de-AT" smtClean="0"/>
-              <a:t>17.01.2014</a:t>
+              <a:t>19.01.2014</a:t>
             </a:fld>
             <a:endParaRPr lang="de-AT"/>
           </a:p>
@@ -3312,7 +3316,7 @@
           <a:p>
             <a:fld id="{18D97213-2954-44C4-8C70-7D9E680F965F}" type="slidenum">
               <a:rPr lang="de-AT" smtClean="0"/>
-              <a:t>‹Nr.›</a:t>
+              <a:t>‹#›</a:t>
             </a:fld>
             <a:endParaRPr lang="de-AT"/>
           </a:p>
@@ -3916,15 +3920,17 @@
           </a:p>
           <a:p>
             <a:r>
-              <a:rPr lang="de-AT" dirty="0" smtClean="0"/>
-              <a:t>XY</a:t>
-            </a:r>
-          </a:p>
-          <a:p>
-            <a:r>
-              <a:rPr lang="de-AT" dirty="0" smtClean="0"/>
-              <a:t>XY</a:t>
-            </a:r>
+              <a:rPr lang="de-AT" dirty="0" err="1" smtClean="0"/>
+              <a:t>Atos</a:t>
+            </a:r>
+            <a:endParaRPr lang="de-AT" dirty="0" smtClean="0"/>
+          </a:p>
+          <a:p>
+            <a:r>
+              <a:rPr lang="de-AT" dirty="0" err="1" smtClean="0"/>
+              <a:t>Austriacard</a:t>
+            </a:r>
+            <a:endParaRPr lang="de-AT" dirty="0" smtClean="0"/>
           </a:p>
           <a:p>
             <a:endParaRPr lang="de-AT" dirty="0"/>
@@ -3932,6 +3938,240 @@
         </p:txBody>
       </p:sp>
     </p:spTree>
+  </p:cSld>
+  <p:clrMapOvr>
+    <a:masterClrMapping/>
+  </p:clrMapOvr>
+</p:sld>
+</file>
+
+<file path=ppt/slides/slide10.xml><?xml version="1.0" encoding="utf-8"?>
+<p:sld xmlns:a="http://schemas.openxmlformats.org/drawingml/2006/main" xmlns:r="http://schemas.openxmlformats.org/officeDocument/2006/relationships" xmlns:p="http://schemas.openxmlformats.org/presentationml/2006/main">
+  <p:cSld>
+    <p:spTree>
+      <p:nvGrpSpPr>
+        <p:cNvPr id="1" name=""/>
+        <p:cNvGrpSpPr/>
+        <p:nvPr/>
+      </p:nvGrpSpPr>
+      <p:grpSpPr>
+        <a:xfrm>
+          <a:off x="0" y="0"/>
+          <a:ext cx="0" cy="0"/>
+          <a:chOff x="0" y="0"/>
+          <a:chExt cx="0" cy="0"/>
+        </a:xfrm>
+      </p:grpSpPr>
+      <p:sp>
+        <p:nvSpPr>
+          <p:cNvPr id="5" name="Textplatzhalter 4"/>
+          <p:cNvSpPr>
+            <a:spLocks noGrp="1"/>
+          </p:cNvSpPr>
+          <p:nvPr>
+            <p:ph type="body" idx="1"/>
+          </p:nvPr>
+        </p:nvSpPr>
+        <p:spPr>
+          <a:xfrm>
+            <a:off x="323528" y="1268761"/>
+            <a:ext cx="8496944" cy="5040560"/>
+          </a:xfrm>
+        </p:spPr>
+        <p:txBody>
+          <a:bodyPr>
+            <a:normAutofit lnSpcReduction="10000"/>
+          </a:bodyPr>
+          <a:lstStyle/>
+          <a:p>
+            <a:endParaRPr lang="de-AT" dirty="0" smtClean="0"/>
+          </a:p>
+          <a:p>
+            <a:r>
+              <a:rPr lang="de-AT" dirty="0" err="1" smtClean="0"/>
+              <a:t>Contactless</a:t>
+            </a:r>
+            <a:r>
+              <a:rPr lang="de-AT" dirty="0" smtClean="0"/>
+              <a:t> Payment </a:t>
+            </a:r>
+            <a:r>
+              <a:rPr lang="de-AT" dirty="0" smtClean="0"/>
+              <a:t>Solution</a:t>
+            </a:r>
+            <a:endParaRPr lang="de-AT" dirty="0" smtClean="0"/>
+          </a:p>
+          <a:p>
+            <a:endParaRPr lang="de-AT" dirty="0" smtClean="0"/>
+          </a:p>
+          <a:p>
+            <a:pPr>
+              <a:buFont typeface="Wingdings" pitchFamily="2" charset="2"/>
+              <a:buChar char="§"/>
+            </a:pPr>
+            <a:endParaRPr lang="de-AT" dirty="0" smtClean="0"/>
+          </a:p>
+          <a:p>
+            <a:pPr>
+              <a:buFont typeface="Wingdings" pitchFamily="2" charset="2"/>
+              <a:buChar char="§"/>
+            </a:pPr>
+            <a:r>
+              <a:rPr lang="de-AT" dirty="0" smtClean="0"/>
+              <a:t>Karte unterstützt </a:t>
+            </a:r>
+            <a:r>
+              <a:rPr lang="de-AT" dirty="0" err="1" smtClean="0"/>
+              <a:t>contactless</a:t>
+            </a:r>
+            <a:r>
+              <a:rPr lang="de-AT" dirty="0" smtClean="0"/>
+              <a:t> und </a:t>
+            </a:r>
+            <a:r>
+              <a:rPr lang="de-AT" dirty="0" err="1" smtClean="0"/>
+              <a:t>contact</a:t>
+            </a:r>
+            <a:r>
+              <a:rPr lang="de-AT" dirty="0" smtClean="0"/>
+              <a:t> </a:t>
+            </a:r>
+            <a:r>
+              <a:rPr lang="de-AT" dirty="0" err="1" smtClean="0"/>
+              <a:t>payment</a:t>
+            </a:r>
+            <a:endParaRPr lang="de-AT" dirty="0"/>
+          </a:p>
+          <a:p>
+            <a:pPr>
+              <a:buFont typeface="Wingdings" pitchFamily="2" charset="2"/>
+              <a:buChar char="§"/>
+            </a:pPr>
+            <a:r>
+              <a:rPr lang="de-AT" dirty="0" smtClean="0"/>
+              <a:t>Dual Interface Karte für</a:t>
+            </a:r>
+          </a:p>
+          <a:p>
+            <a:pPr lvl="1">
+              <a:buFont typeface="Wingdings" pitchFamily="2" charset="2"/>
+              <a:buChar char="§"/>
+            </a:pPr>
+            <a:r>
+              <a:rPr lang="de-AT" dirty="0" smtClean="0"/>
+              <a:t>MasterCard </a:t>
+            </a:r>
+            <a:r>
+              <a:rPr lang="de-AT" dirty="0" err="1" smtClean="0"/>
+              <a:t>PayPass</a:t>
+            </a:r>
+            <a:endParaRPr lang="de-AT" dirty="0" smtClean="0"/>
+          </a:p>
+          <a:p>
+            <a:pPr lvl="1">
+              <a:buFont typeface="Wingdings" pitchFamily="2" charset="2"/>
+              <a:buChar char="§"/>
+            </a:pPr>
+            <a:r>
+              <a:rPr lang="de-AT" dirty="0" smtClean="0"/>
+              <a:t>Visa </a:t>
+            </a:r>
+            <a:r>
+              <a:rPr lang="de-AT" dirty="0" err="1" smtClean="0"/>
+              <a:t>PayWave</a:t>
+            </a:r>
+            <a:endParaRPr lang="de-AT" dirty="0" smtClean="0"/>
+          </a:p>
+          <a:p>
+            <a:pPr>
+              <a:buFont typeface="Wingdings" pitchFamily="2" charset="2"/>
+              <a:buChar char="§"/>
+            </a:pPr>
+            <a:r>
+              <a:rPr lang="de-AT" dirty="0" smtClean="0"/>
+              <a:t>ISO/IEC 7816-4 Filesystem mit besonderen Sicherheitsmechanismen</a:t>
+            </a:r>
+          </a:p>
+          <a:p>
+            <a:pPr>
+              <a:buFont typeface="Wingdings" pitchFamily="2" charset="2"/>
+              <a:buChar char="§"/>
+            </a:pPr>
+            <a:r>
+              <a:rPr lang="de-AT" dirty="0" smtClean="0"/>
+              <a:t>Unterstützung von mehr als 10 verschiedenen Sicherheitsmechanismen zum Schutz der Karte vor Kopien</a:t>
+            </a:r>
+          </a:p>
+          <a:p>
+            <a:pPr>
+              <a:buFont typeface="Wingdings" pitchFamily="2" charset="2"/>
+              <a:buChar char="§"/>
+            </a:pPr>
+            <a:r>
+              <a:rPr lang="de-AT" dirty="0" smtClean="0"/>
+              <a:t>Jährliche Produktion von rund 70 Millionen Karten</a:t>
+            </a:r>
+          </a:p>
+          <a:p>
+            <a:pPr>
+              <a:buFont typeface="Wingdings" pitchFamily="2" charset="2"/>
+              <a:buChar char="§"/>
+            </a:pPr>
+            <a:r>
+              <a:rPr lang="de-AT" smtClean="0"/>
+              <a:t>Eigens entwickelte EMV Maske (ACE)</a:t>
+            </a:r>
+            <a:endParaRPr lang="de-AT" dirty="0" smtClean="0"/>
+          </a:p>
+        </p:txBody>
+      </p:sp>
+      <p:pic>
+        <p:nvPicPr>
+          <p:cNvPr id="4" name="Picture 2" descr="http://www.sdw2014.com/creo_files/default/austria_card.jpg"/>
+          <p:cNvPicPr>
+            <a:picLocks noChangeAspect="1" noChangeArrowheads="1"/>
+          </p:cNvPicPr>
+          <p:nvPr/>
+        </p:nvPicPr>
+        <p:blipFill>
+          <a:blip r:embed="rId2">
+            <a:extLst>
+              <a:ext uri="{28A0092B-C50C-407E-A947-70E740481C1C}">
+                <a14:useLocalDpi xmlns:a14="http://schemas.microsoft.com/office/drawing/2010/main" val="0"/>
+              </a:ext>
+            </a:extLst>
+          </a:blip>
+          <a:srcRect/>
+          <a:stretch>
+            <a:fillRect/>
+          </a:stretch>
+        </p:blipFill>
+        <p:spPr bwMode="auto">
+          <a:xfrm>
+            <a:off x="4572000" y="1169363"/>
+            <a:ext cx="4104456" cy="949685"/>
+          </a:xfrm>
+          <a:prstGeom prst="rect">
+            <a:avLst/>
+          </a:prstGeom>
+          <a:noFill/>
+          <a:extLst>
+            <a:ext uri="{909E8E84-426E-40DD-AFC4-6F175D3DCCD1}">
+              <a14:hiddenFill xmlns:a14="http://schemas.microsoft.com/office/drawing/2010/main">
+                <a:solidFill>
+                  <a:srgbClr val="FFFFFF"/>
+                </a:solidFill>
+              </a14:hiddenFill>
+            </a:ext>
+          </a:extLst>
+        </p:spPr>
+      </p:pic>
+    </p:spTree>
+    <p:extLst>
+      <p:ext uri="{BB962C8B-B14F-4D97-AF65-F5344CB8AC3E}">
+        <p14:creationId xmlns:p14="http://schemas.microsoft.com/office/powerpoint/2010/main" val="1957840277"/>
+      </p:ext>
+    </p:extLst>
   </p:cSld>
   <p:clrMapOvr>
     <a:masterClrMapping/>
@@ -4091,11 +4331,7 @@
             </a:pPr>
             <a:r>
               <a:rPr lang="de-AT" dirty="0" smtClean="0"/>
-              <a:t> </a:t>
-            </a:r>
-            <a:r>
-              <a:rPr lang="de-AT" dirty="0" smtClean="0"/>
-              <a:t>Weltweit über 16.000 Kunden</a:t>
+              <a:t> Weltweit über 16.000 Kunden</a:t>
             </a:r>
           </a:p>
           <a:p>
@@ -4115,11 +4351,7 @@
             </a:pPr>
             <a:r>
               <a:rPr lang="de-AT" dirty="0" smtClean="0"/>
-              <a:t> </a:t>
-            </a:r>
-            <a:r>
-              <a:rPr lang="de-AT" dirty="0" smtClean="0"/>
-              <a:t>Börsennotiert  im Aktienindex  S&amp;P 500 und NASDAQ-100</a:t>
+              <a:t> Börsennotiert  im Aktienindex  S&amp;P 500 und NASDAQ-100</a:t>
             </a:r>
           </a:p>
           <a:p>
@@ -4147,11 +4379,7 @@
             </a:pPr>
             <a:r>
               <a:rPr lang="de-AT" dirty="0" smtClean="0"/>
-              <a:t> </a:t>
-            </a:r>
-            <a:r>
-              <a:rPr lang="de-AT" dirty="0" smtClean="0"/>
-              <a:t>155 Standorte weltweit</a:t>
+              <a:t> 155 Standorte weltweit</a:t>
             </a:r>
           </a:p>
           <a:p>
@@ -4161,11 +4389,7 @@
             </a:pPr>
             <a:r>
               <a:rPr lang="de-AT" dirty="0" smtClean="0"/>
-              <a:t> </a:t>
-            </a:r>
-            <a:r>
-              <a:rPr lang="de-AT" dirty="0" smtClean="0"/>
-              <a:t>Mitarbeiter 21.000 (2011)</a:t>
+              <a:t> Mitarbeiter 21.000 (2011)</a:t>
             </a:r>
           </a:p>
           <a:p>
@@ -4175,11 +4399,7 @@
             </a:pPr>
             <a:r>
               <a:rPr lang="de-AT" dirty="0" smtClean="0"/>
-              <a:t> </a:t>
-            </a:r>
-            <a:r>
-              <a:rPr lang="de-AT" dirty="0" smtClean="0"/>
-              <a:t>Website </a:t>
+              <a:t> Website </a:t>
             </a:r>
             <a:r>
               <a:rPr lang="de-AT" dirty="0" smtClean="0">
@@ -4196,11 +4416,7 @@
             </a:pPr>
             <a:r>
               <a:rPr lang="de-AT" dirty="0" smtClean="0"/>
-              <a:t> </a:t>
-            </a:r>
-            <a:r>
-              <a:rPr lang="de-AT" dirty="0" smtClean="0"/>
-              <a:t>Umsatz $4.48 Milliarden (2012)</a:t>
+              <a:t> Umsatz $4.48 Milliarden (2012)</a:t>
             </a:r>
           </a:p>
           <a:p>
@@ -4309,11 +4525,7 @@
             </a:pPr>
             <a:r>
               <a:rPr lang="de-AT" dirty="0" smtClean="0"/>
-              <a:t> </a:t>
-            </a:r>
-            <a:r>
-              <a:rPr lang="de-AT" dirty="0" smtClean="0"/>
-              <a:t>Bevorzugte Lösung von über 450 Finanzinstitutionen und Banken</a:t>
+              <a:t> Bevorzugte Lösung von über 450 Finanzinstitutionen und Banken</a:t>
             </a:r>
           </a:p>
           <a:p>
@@ -4323,11 +4535,7 @@
             </a:pPr>
             <a:r>
               <a:rPr lang="de-AT" dirty="0" smtClean="0"/>
-              <a:t> </a:t>
-            </a:r>
-            <a:r>
-              <a:rPr lang="de-AT" dirty="0" smtClean="0"/>
-              <a:t>Umfangreiche, sichere, kostengünstige Mobile Banking Plattform</a:t>
+              <a:t> Umfangreiche, sichere, kostengünstige Mobile Banking Plattform</a:t>
             </a:r>
           </a:p>
           <a:p>
@@ -4371,11 +4579,7 @@
             </a:pPr>
             <a:r>
               <a:rPr lang="de-AT" dirty="0" smtClean="0"/>
-              <a:t> </a:t>
-            </a:r>
-            <a:r>
-              <a:rPr lang="de-AT" dirty="0" smtClean="0"/>
-              <a:t>Flexible Skalierbarkeit und Erweiterbarkeit der Funktionalität</a:t>
+              <a:t> Flexible Skalierbarkeit und Erweiterbarkeit der Funktionalität</a:t>
             </a:r>
           </a:p>
           <a:p>
@@ -4385,11 +4589,7 @@
             </a:pPr>
             <a:r>
               <a:rPr lang="de-AT" dirty="0" smtClean="0"/>
-              <a:t> </a:t>
-            </a:r>
-            <a:r>
-              <a:rPr lang="de-AT" dirty="0" smtClean="0"/>
-              <a:t>Volle Integration mit Online Banking System</a:t>
+              <a:t> Volle Integration mit Online Banking System</a:t>
             </a:r>
           </a:p>
           <a:p>
@@ -4409,11 +4609,7 @@
             </a:pPr>
             <a:r>
               <a:rPr lang="de-AT" dirty="0" smtClean="0"/>
-              <a:t> </a:t>
-            </a:r>
-            <a:r>
-              <a:rPr lang="de-AT" dirty="0" smtClean="0"/>
-              <a:t>Systemwartung und	Weiterentwicklung</a:t>
+              <a:t> Systemwartung und	Weiterentwicklung</a:t>
             </a:r>
           </a:p>
           <a:p>
@@ -4423,11 +4619,7 @@
             </a:pPr>
             <a:r>
               <a:rPr lang="de-AT" dirty="0" smtClean="0"/>
-              <a:t> </a:t>
-            </a:r>
-            <a:r>
-              <a:rPr lang="de-AT" dirty="0" smtClean="0"/>
-              <a:t>Kundensupport und Reporting Tools</a:t>
+              <a:t> Kundensupport und Reporting Tools</a:t>
             </a:r>
           </a:p>
           <a:p>
@@ -4437,11 +4629,7 @@
             </a:pPr>
             <a:r>
               <a:rPr lang="de-AT" dirty="0" smtClean="0"/>
-              <a:t> </a:t>
-            </a:r>
-            <a:r>
-              <a:rPr lang="de-AT" dirty="0" smtClean="0"/>
-              <a:t>Analyse und Diagnose Tools</a:t>
+              <a:t> Analyse und Diagnose Tools</a:t>
             </a:r>
           </a:p>
         </p:txBody>
@@ -4513,8 +4701,8 @@
           <a:lstStyle/>
           <a:p>
             <a:r>
-              <a:rPr lang="de-AT" dirty="0" smtClean="0"/>
-              <a:t>XY</a:t>
+              <a:rPr lang="de-AT" dirty="0" err="1" smtClean="0"/>
+              <a:t>Atos</a:t>
             </a:r>
             <a:endParaRPr lang="de-AT" dirty="0"/>
           </a:p>
@@ -4578,6 +4766,473 @@
       </p:grpSpPr>
       <p:sp>
         <p:nvSpPr>
+          <p:cNvPr id="5" name="Textplatzhalter 4"/>
+          <p:cNvSpPr>
+            <a:spLocks noGrp="1"/>
+          </p:cNvSpPr>
+          <p:nvPr>
+            <p:ph type="body" idx="1"/>
+          </p:nvPr>
+        </p:nvSpPr>
+        <p:spPr>
+          <a:xfrm>
+            <a:off x="323528" y="1268761"/>
+            <a:ext cx="8496944" cy="5040560"/>
+          </a:xfrm>
+        </p:spPr>
+        <p:txBody>
+          <a:bodyPr/>
+          <a:lstStyle/>
+          <a:p>
+            <a:endParaRPr lang="de-AT" dirty="0" smtClean="0"/>
+          </a:p>
+          <a:p>
+            <a:r>
+              <a:rPr lang="de-AT" dirty="0" smtClean="0"/>
+              <a:t>Über </a:t>
+            </a:r>
+            <a:r>
+              <a:rPr lang="de-AT" dirty="0" err="1" smtClean="0"/>
+              <a:t>Atos</a:t>
+            </a:r>
+            <a:endParaRPr lang="de-AT" dirty="0" smtClean="0"/>
+          </a:p>
+          <a:p>
+            <a:pPr>
+              <a:buFont typeface="Wingdings" pitchFamily="2" charset="2"/>
+              <a:buChar char="§"/>
+            </a:pPr>
+            <a:endParaRPr lang="de-AT" dirty="0" smtClean="0"/>
+          </a:p>
+          <a:p>
+            <a:pPr>
+              <a:buFont typeface="Wingdings" pitchFamily="2" charset="2"/>
+              <a:buChar char="§"/>
+            </a:pPr>
+            <a:endParaRPr lang="de-AT" dirty="0" smtClean="0"/>
+          </a:p>
+          <a:p>
+            <a:pPr>
+              <a:buFont typeface="Wingdings" pitchFamily="2" charset="2"/>
+              <a:buChar char="§"/>
+            </a:pPr>
+            <a:r>
+              <a:rPr lang="de-AT" dirty="0" smtClean="0"/>
+              <a:t>#</a:t>
+            </a:r>
+            <a:r>
+              <a:rPr lang="de-AT" dirty="0"/>
+              <a:t>2 am europäischen IT-Service Markt </a:t>
+            </a:r>
+            <a:endParaRPr lang="de-AT" dirty="0" smtClean="0"/>
+          </a:p>
+          <a:p>
+            <a:pPr>
+              <a:buFont typeface="Wingdings" pitchFamily="2" charset="2"/>
+              <a:buChar char="§"/>
+            </a:pPr>
+            <a:r>
+              <a:rPr lang="de-AT" dirty="0" smtClean="0"/>
+              <a:t>Börsennotiert im Euronext als ATO</a:t>
+            </a:r>
+          </a:p>
+          <a:p>
+            <a:pPr>
+              <a:buFont typeface="Wingdings" pitchFamily="2" charset="2"/>
+              <a:buChar char="§"/>
+            </a:pPr>
+            <a:r>
+              <a:rPr lang="de-AT" dirty="0" smtClean="0"/>
+              <a:t>Gegründet 1997</a:t>
+            </a:r>
+          </a:p>
+          <a:p>
+            <a:pPr>
+              <a:buFont typeface="Wingdings" pitchFamily="2" charset="2"/>
+              <a:buChar char="§"/>
+            </a:pPr>
+            <a:r>
+              <a:rPr lang="de-AT" dirty="0" smtClean="0"/>
+              <a:t>Mitarbeiter 76.000 (in 48 Ländern)</a:t>
+            </a:r>
+          </a:p>
+          <a:p>
+            <a:pPr>
+              <a:buFont typeface="Wingdings" pitchFamily="2" charset="2"/>
+              <a:buChar char="§"/>
+            </a:pPr>
+            <a:r>
+              <a:rPr lang="de-AT" dirty="0" smtClean="0"/>
+              <a:t>Hauptsitz </a:t>
+            </a:r>
+            <a:r>
+              <a:rPr lang="de-AT" dirty="0" err="1" smtClean="0"/>
+              <a:t>Bezons</a:t>
+            </a:r>
+            <a:r>
+              <a:rPr lang="de-AT" dirty="0" smtClean="0"/>
+              <a:t>, Frankreich</a:t>
+            </a:r>
+          </a:p>
+          <a:p>
+            <a:pPr>
+              <a:buFont typeface="Wingdings" pitchFamily="2" charset="2"/>
+              <a:buChar char="§"/>
+            </a:pPr>
+            <a:r>
+              <a:rPr lang="de-AT" dirty="0" smtClean="0"/>
+              <a:t>Website </a:t>
+            </a:r>
+            <a:r>
+              <a:rPr lang="de-AT" dirty="0" smtClean="0">
+                <a:hlinkClick r:id="rId2"/>
+              </a:rPr>
+              <a:t>www.atos.net</a:t>
+            </a:r>
+            <a:r>
+              <a:rPr lang="de-AT" dirty="0" smtClean="0"/>
+              <a:t> </a:t>
+            </a:r>
+          </a:p>
+          <a:p>
+            <a:pPr>
+              <a:buFont typeface="Wingdings" pitchFamily="2" charset="2"/>
+              <a:buChar char="§"/>
+            </a:pPr>
+            <a:r>
+              <a:rPr lang="de-AT" dirty="0" smtClean="0"/>
+              <a:t>Umsatz € 8,85 </a:t>
+            </a:r>
+            <a:r>
+              <a:rPr lang="de-AT" dirty="0" err="1" smtClean="0"/>
+              <a:t>Millarden</a:t>
+            </a:r>
+            <a:r>
+              <a:rPr lang="de-AT" dirty="0" smtClean="0"/>
+              <a:t> (2012)</a:t>
+            </a:r>
+            <a:endParaRPr lang="de-AT" dirty="0" smtClean="0"/>
+          </a:p>
+        </p:txBody>
+      </p:sp>
+      <p:pic>
+        <p:nvPicPr>
+          <p:cNvPr id="2050" name="Picture 2" descr="http://www.wonderware.com/Solution_providers/SI/images/atos.jpg"/>
+          <p:cNvPicPr>
+            <a:picLocks noChangeAspect="1" noChangeArrowheads="1"/>
+          </p:cNvPicPr>
+          <p:nvPr/>
+        </p:nvPicPr>
+        <p:blipFill>
+          <a:blip r:embed="rId3" cstate="print">
+            <a:extLst>
+              <a:ext uri="{28A0092B-C50C-407E-A947-70E740481C1C}">
+                <a14:useLocalDpi xmlns:a14="http://schemas.microsoft.com/office/drawing/2010/main" val="0"/>
+              </a:ext>
+            </a:extLst>
+          </a:blip>
+          <a:srcRect/>
+          <a:stretch>
+            <a:fillRect/>
+          </a:stretch>
+        </p:blipFill>
+        <p:spPr bwMode="auto">
+          <a:xfrm>
+            <a:off x="6084168" y="836712"/>
+            <a:ext cx="2232248" cy="1578030"/>
+          </a:xfrm>
+          <a:prstGeom prst="rect">
+            <a:avLst/>
+          </a:prstGeom>
+          <a:noFill/>
+          <a:extLst>
+            <a:ext uri="{909E8E84-426E-40DD-AFC4-6F175D3DCCD1}">
+              <a14:hiddenFill xmlns:a14="http://schemas.microsoft.com/office/drawing/2010/main">
+                <a:solidFill>
+                  <a:srgbClr val="FFFFFF"/>
+                </a:solidFill>
+              </a14:hiddenFill>
+            </a:ext>
+          </a:extLst>
+        </p:spPr>
+      </p:pic>
+    </p:spTree>
+    <p:extLst>
+      <p:ext uri="{BB962C8B-B14F-4D97-AF65-F5344CB8AC3E}">
+        <p14:creationId xmlns:p14="http://schemas.microsoft.com/office/powerpoint/2010/main" val="1545636436"/>
+      </p:ext>
+    </p:extLst>
+  </p:cSld>
+  <p:clrMapOvr>
+    <a:masterClrMapping/>
+  </p:clrMapOvr>
+</p:sld>
+</file>
+
+<file path=ppt/slides/slide7.xml><?xml version="1.0" encoding="utf-8"?>
+<p:sld xmlns:a="http://schemas.openxmlformats.org/drawingml/2006/main" xmlns:r="http://schemas.openxmlformats.org/officeDocument/2006/relationships" xmlns:p="http://schemas.openxmlformats.org/presentationml/2006/main">
+  <p:cSld>
+    <p:spTree>
+      <p:nvGrpSpPr>
+        <p:cNvPr id="1" name=""/>
+        <p:cNvGrpSpPr/>
+        <p:nvPr/>
+      </p:nvGrpSpPr>
+      <p:grpSpPr>
+        <a:xfrm>
+          <a:off x="0" y="0"/>
+          <a:ext cx="0" cy="0"/>
+          <a:chOff x="0" y="0"/>
+          <a:chExt cx="0" cy="0"/>
+        </a:xfrm>
+      </p:grpSpPr>
+      <p:sp>
+        <p:nvSpPr>
+          <p:cNvPr id="5" name="Textplatzhalter 4"/>
+          <p:cNvSpPr>
+            <a:spLocks noGrp="1"/>
+          </p:cNvSpPr>
+          <p:nvPr>
+            <p:ph type="body" idx="1"/>
+          </p:nvPr>
+        </p:nvSpPr>
+        <p:spPr>
+          <a:xfrm>
+            <a:off x="323528" y="1268761"/>
+            <a:ext cx="8496944" cy="5040560"/>
+          </a:xfrm>
+        </p:spPr>
+        <p:txBody>
+          <a:bodyPr>
+            <a:normAutofit/>
+          </a:bodyPr>
+          <a:lstStyle/>
+          <a:p>
+            <a:endParaRPr lang="de-AT" dirty="0" smtClean="0"/>
+          </a:p>
+          <a:p>
+            <a:r>
+              <a:rPr lang="de-AT" dirty="0" smtClean="0"/>
+              <a:t>Cloud Computing Solution</a:t>
+            </a:r>
+            <a:endParaRPr lang="de-AT" dirty="0" smtClean="0"/>
+          </a:p>
+          <a:p>
+            <a:endParaRPr lang="de-AT" dirty="0" smtClean="0"/>
+          </a:p>
+          <a:p>
+            <a:pPr>
+              <a:buFont typeface="Wingdings" pitchFamily="2" charset="2"/>
+              <a:buChar char="§"/>
+            </a:pPr>
+            <a:endParaRPr lang="de-AT" dirty="0" smtClean="0"/>
+          </a:p>
+          <a:p>
+            <a:pPr>
+              <a:buFont typeface="Wingdings" pitchFamily="2" charset="2"/>
+              <a:buChar char="§"/>
+            </a:pPr>
+            <a:r>
+              <a:rPr lang="de-AT" dirty="0" smtClean="0"/>
+              <a:t>Tochterfirma </a:t>
+            </a:r>
+            <a:r>
+              <a:rPr lang="de-AT" dirty="0" err="1" smtClean="0"/>
+              <a:t>Canopy</a:t>
+            </a:r>
+            <a:r>
+              <a:rPr lang="de-AT" dirty="0" smtClean="0"/>
+              <a:t> spezialisiert auf Cloud Computing</a:t>
+            </a:r>
+          </a:p>
+          <a:p>
+            <a:pPr>
+              <a:buFont typeface="Wingdings" pitchFamily="2" charset="2"/>
+              <a:buChar char="§"/>
+            </a:pPr>
+            <a:r>
+              <a:rPr lang="de-AT" dirty="0" smtClean="0"/>
+              <a:t>Bietet </a:t>
+            </a:r>
+            <a:r>
+              <a:rPr lang="de-AT" dirty="0" err="1" smtClean="0"/>
+              <a:t>PaaS</a:t>
+            </a:r>
+            <a:r>
+              <a:rPr lang="de-AT" dirty="0" smtClean="0"/>
+              <a:t>, SaaS und </a:t>
+            </a:r>
+            <a:r>
+              <a:rPr lang="de-AT" dirty="0" err="1" smtClean="0"/>
+              <a:t>IaaS</a:t>
+            </a:r>
+            <a:r>
+              <a:rPr lang="de-AT" dirty="0" smtClean="0"/>
+              <a:t> an</a:t>
+            </a:r>
+          </a:p>
+          <a:p>
+            <a:pPr>
+              <a:buFont typeface="Wingdings" pitchFamily="2" charset="2"/>
+              <a:buChar char="§"/>
+            </a:pPr>
+            <a:r>
+              <a:rPr lang="de-AT" dirty="0" smtClean="0"/>
+              <a:t>Spezielle Konzentration auf Sicherheit</a:t>
+            </a:r>
+          </a:p>
+          <a:p>
+            <a:pPr>
+              <a:buFont typeface="Wingdings" pitchFamily="2" charset="2"/>
+              <a:buChar char="§"/>
+            </a:pPr>
+            <a:r>
+              <a:rPr lang="de-AT" dirty="0" smtClean="0"/>
+              <a:t>Public und Private Cloud</a:t>
+            </a:r>
+          </a:p>
+          <a:p>
+            <a:pPr>
+              <a:buFont typeface="Wingdings" pitchFamily="2" charset="2"/>
+              <a:buChar char="§"/>
+            </a:pPr>
+            <a:r>
+              <a:rPr lang="de-AT" dirty="0" smtClean="0"/>
+              <a:t>Eigener SaaS Enterprise </a:t>
+            </a:r>
+            <a:r>
+              <a:rPr lang="de-AT" dirty="0" err="1" smtClean="0"/>
+              <a:t>Application</a:t>
+            </a:r>
+            <a:r>
+              <a:rPr lang="de-AT" dirty="0" smtClean="0"/>
+              <a:t> Store</a:t>
+            </a:r>
+          </a:p>
+          <a:p>
+            <a:pPr>
+              <a:buFont typeface="Wingdings" pitchFamily="2" charset="2"/>
+              <a:buChar char="§"/>
+            </a:pPr>
+            <a:r>
+              <a:rPr lang="de-AT" dirty="0" smtClean="0"/>
+              <a:t>Enterprise Level SLAs</a:t>
+            </a:r>
+          </a:p>
+          <a:p>
+            <a:pPr>
+              <a:buFont typeface="Wingdings" pitchFamily="2" charset="2"/>
+              <a:buChar char="§"/>
+            </a:pPr>
+            <a:r>
+              <a:rPr lang="de-AT" dirty="0" smtClean="0"/>
+              <a:t>Erfahrenes Consulting Team</a:t>
+            </a:r>
+            <a:endParaRPr lang="de-AT" dirty="0" smtClean="0"/>
+          </a:p>
+          <a:p>
+            <a:pPr>
+              <a:buFont typeface="Wingdings" pitchFamily="2" charset="2"/>
+              <a:buChar char="§"/>
+            </a:pPr>
+            <a:endParaRPr lang="de-AT" dirty="0" smtClean="0"/>
+          </a:p>
+          <a:p>
+            <a:pPr>
+              <a:buFont typeface="Wingdings" pitchFamily="2" charset="2"/>
+              <a:buChar char="§"/>
+            </a:pPr>
+            <a:endParaRPr lang="de-AT" dirty="0" smtClean="0"/>
+          </a:p>
+          <a:p>
+            <a:pPr>
+              <a:buFont typeface="Wingdings" pitchFamily="2" charset="2"/>
+              <a:buChar char="§"/>
+            </a:pPr>
+            <a:endParaRPr lang="de-AT" dirty="0" smtClean="0"/>
+          </a:p>
+          <a:p>
+            <a:pPr>
+              <a:buFont typeface="Wingdings" pitchFamily="2" charset="2"/>
+              <a:buChar char="§"/>
+            </a:pPr>
+            <a:endParaRPr lang="de-AT" dirty="0" smtClean="0"/>
+          </a:p>
+        </p:txBody>
+      </p:sp>
+      <p:pic>
+        <p:nvPicPr>
+          <p:cNvPr id="4" name="Picture 2" descr="http://www.wonderware.com/Solution_providers/SI/images/atos.jpg"/>
+          <p:cNvPicPr>
+            <a:picLocks noChangeAspect="1" noChangeArrowheads="1"/>
+          </p:cNvPicPr>
+          <p:nvPr/>
+        </p:nvPicPr>
+        <p:blipFill>
+          <a:blip r:embed="rId2" cstate="print">
+            <a:extLst>
+              <a:ext uri="{28A0092B-C50C-407E-A947-70E740481C1C}">
+                <a14:useLocalDpi xmlns:a14="http://schemas.microsoft.com/office/drawing/2010/main" val="0"/>
+              </a:ext>
+            </a:extLst>
+          </a:blip>
+          <a:srcRect/>
+          <a:stretch>
+            <a:fillRect/>
+          </a:stretch>
+        </p:blipFill>
+        <p:spPr bwMode="auto">
+          <a:xfrm>
+            <a:off x="6084168" y="836712"/>
+            <a:ext cx="2232248" cy="1578030"/>
+          </a:xfrm>
+          <a:prstGeom prst="rect">
+            <a:avLst/>
+          </a:prstGeom>
+          <a:noFill/>
+          <a:extLst>
+            <a:ext uri="{909E8E84-426E-40DD-AFC4-6F175D3DCCD1}">
+              <a14:hiddenFill xmlns:a14="http://schemas.microsoft.com/office/drawing/2010/main">
+                <a:solidFill>
+                  <a:srgbClr val="FFFFFF"/>
+                </a:solidFill>
+              </a14:hiddenFill>
+            </a:ext>
+          </a:extLst>
+        </p:spPr>
+      </p:pic>
+    </p:spTree>
+    <p:extLst>
+      <p:ext uri="{BB962C8B-B14F-4D97-AF65-F5344CB8AC3E}">
+        <p14:creationId xmlns:p14="http://schemas.microsoft.com/office/powerpoint/2010/main" val="1957840277"/>
+      </p:ext>
+    </p:extLst>
+  </p:cSld>
+  <p:clrMapOvr>
+    <a:masterClrMapping/>
+  </p:clrMapOvr>
+</p:sld>
+</file>
+
+<file path=ppt/slides/slide8.xml><?xml version="1.0" encoding="utf-8"?>
+<p:sld xmlns:a="http://schemas.openxmlformats.org/drawingml/2006/main" xmlns:r="http://schemas.openxmlformats.org/officeDocument/2006/relationships" xmlns:p="http://schemas.openxmlformats.org/presentationml/2006/main">
+  <p:cSld>
+    <p:spTree>
+      <p:nvGrpSpPr>
+        <p:cNvPr id="1" name=""/>
+        <p:cNvGrpSpPr/>
+        <p:nvPr/>
+      </p:nvGrpSpPr>
+      <p:grpSpPr>
+        <a:xfrm>
+          <a:off x="0" y="0"/>
+          <a:ext cx="0" cy="0"/>
+          <a:chOff x="0" y="0"/>
+          <a:chExt cx="0" cy="0"/>
+        </a:xfrm>
+      </p:grpSpPr>
+      <p:sp>
+        <p:nvSpPr>
           <p:cNvPr id="4" name="Titel 3"/>
           <p:cNvSpPr>
             <a:spLocks noGrp="1"/>
@@ -4592,8 +5247,8 @@
           <a:lstStyle/>
           <a:p>
             <a:r>
-              <a:rPr lang="de-AT" dirty="0" smtClean="0"/>
-              <a:t>XY</a:t>
+              <a:rPr lang="de-AT" dirty="0" err="1" smtClean="0"/>
+              <a:t>Austriacard</a:t>
             </a:r>
             <a:endParaRPr lang="de-AT" dirty="0"/>
           </a:p>
@@ -4631,6 +5286,246 @@
         </p:txBody>
       </p:sp>
     </p:spTree>
+  </p:cSld>
+  <p:clrMapOvr>
+    <a:masterClrMapping/>
+  </p:clrMapOvr>
+</p:sld>
+</file>
+
+<file path=ppt/slides/slide9.xml><?xml version="1.0" encoding="utf-8"?>
+<p:sld xmlns:a="http://schemas.openxmlformats.org/drawingml/2006/main" xmlns:r="http://schemas.openxmlformats.org/officeDocument/2006/relationships" xmlns:p="http://schemas.openxmlformats.org/presentationml/2006/main">
+  <p:cSld>
+    <p:spTree>
+      <p:nvGrpSpPr>
+        <p:cNvPr id="1" name=""/>
+        <p:cNvGrpSpPr/>
+        <p:nvPr/>
+      </p:nvGrpSpPr>
+      <p:grpSpPr>
+        <a:xfrm>
+          <a:off x="0" y="0"/>
+          <a:ext cx="0" cy="0"/>
+          <a:chOff x="0" y="0"/>
+          <a:chExt cx="0" cy="0"/>
+        </a:xfrm>
+      </p:grpSpPr>
+      <p:sp>
+        <p:nvSpPr>
+          <p:cNvPr id="5" name="Textplatzhalter 4"/>
+          <p:cNvSpPr>
+            <a:spLocks noGrp="1"/>
+          </p:cNvSpPr>
+          <p:nvPr>
+            <p:ph type="body" idx="1"/>
+          </p:nvPr>
+        </p:nvSpPr>
+        <p:spPr>
+          <a:xfrm>
+            <a:off x="323528" y="1268761"/>
+            <a:ext cx="8496944" cy="5040560"/>
+          </a:xfrm>
+        </p:spPr>
+        <p:txBody>
+          <a:bodyPr/>
+          <a:lstStyle/>
+          <a:p>
+            <a:endParaRPr lang="de-AT" dirty="0" smtClean="0"/>
+          </a:p>
+          <a:p>
+            <a:r>
+              <a:rPr lang="de-AT" dirty="0" smtClean="0"/>
+              <a:t>Über </a:t>
+            </a:r>
+            <a:r>
+              <a:rPr lang="de-AT" dirty="0" err="1" smtClean="0"/>
+              <a:t>Austriacard</a:t>
+            </a:r>
+            <a:endParaRPr lang="de-AT" dirty="0" smtClean="0"/>
+          </a:p>
+          <a:p>
+            <a:endParaRPr lang="de-AT" dirty="0"/>
+          </a:p>
+          <a:p>
+            <a:pPr marL="342900" indent="-342900">
+              <a:buFont typeface="Arial" panose="020B0604020202020204" pitchFamily="34" charset="0"/>
+              <a:buChar char="•"/>
+            </a:pPr>
+            <a:r>
+              <a:rPr lang="de-AT" dirty="0" smtClean="0"/>
+              <a:t>Spezialisiert auf  </a:t>
+            </a:r>
+            <a:r>
+              <a:rPr lang="de-AT" dirty="0" err="1" smtClean="0"/>
+              <a:t>Microchip</a:t>
+            </a:r>
+            <a:r>
+              <a:rPr lang="de-AT" dirty="0" smtClean="0"/>
+              <a:t> Karten</a:t>
+            </a:r>
+          </a:p>
+          <a:p>
+            <a:pPr marL="342900" indent="-342900">
+              <a:buFont typeface="Arial" panose="020B0604020202020204" pitchFamily="34" charset="0"/>
+              <a:buChar char="•"/>
+            </a:pPr>
+            <a:r>
+              <a:rPr lang="de-AT" dirty="0" smtClean="0"/>
+              <a:t>Hochinnovatives Unternehmen und Marktführer in Österreich</a:t>
+            </a:r>
+            <a:endParaRPr lang="de-AT" dirty="0" smtClean="0"/>
+          </a:p>
+          <a:p>
+            <a:pPr marL="342900" indent="-342900">
+              <a:buFont typeface="Arial" panose="020B0604020202020204" pitchFamily="34" charset="0"/>
+              <a:buChar char="•"/>
+            </a:pPr>
+            <a:r>
+              <a:rPr lang="de-AT" dirty="0" smtClean="0"/>
+              <a:t>Gegründet 1981</a:t>
+            </a:r>
+          </a:p>
+          <a:p>
+            <a:pPr marL="342900" indent="-342900">
+              <a:buFont typeface="Arial" panose="020B0604020202020204" pitchFamily="34" charset="0"/>
+              <a:buChar char="•"/>
+            </a:pPr>
+            <a:r>
+              <a:rPr lang="de-AT" dirty="0" smtClean="0"/>
+              <a:t>Mitarbeiter 300</a:t>
+            </a:r>
+          </a:p>
+          <a:p>
+            <a:pPr marL="342900" indent="-342900">
+              <a:buFont typeface="Arial" panose="020B0604020202020204" pitchFamily="34" charset="0"/>
+              <a:buChar char="•"/>
+            </a:pPr>
+            <a:r>
+              <a:rPr lang="de-AT" dirty="0" smtClean="0"/>
+              <a:t>Hauptsitz Wien</a:t>
+            </a:r>
+          </a:p>
+          <a:p>
+            <a:pPr marL="342900" indent="-342900">
+              <a:buFont typeface="Arial" panose="020B0604020202020204" pitchFamily="34" charset="0"/>
+              <a:buChar char="•"/>
+            </a:pPr>
+            <a:r>
+              <a:rPr lang="de-AT" dirty="0" smtClean="0"/>
+              <a:t>Teil der </a:t>
+            </a:r>
+            <a:r>
+              <a:rPr lang="de-AT" dirty="0" err="1" smtClean="0"/>
+              <a:t>Lykos</a:t>
+            </a:r>
+            <a:r>
+              <a:rPr lang="de-AT" dirty="0" smtClean="0"/>
+              <a:t>-Gruppe</a:t>
+            </a:r>
+          </a:p>
+          <a:p>
+            <a:pPr marL="342900" indent="-342900">
+              <a:buFont typeface="Arial" panose="020B0604020202020204" pitchFamily="34" charset="0"/>
+              <a:buChar char="•"/>
+            </a:pPr>
+            <a:r>
+              <a:rPr lang="de-AT" dirty="0" smtClean="0"/>
+              <a:t>Homepage </a:t>
+            </a:r>
+            <a:r>
+              <a:rPr lang="de-AT" dirty="0" smtClean="0">
+                <a:hlinkClick r:id="rId2"/>
+              </a:rPr>
+              <a:t>www.austriacard.at</a:t>
+            </a:r>
+            <a:r>
+              <a:rPr lang="de-AT" dirty="0" smtClean="0"/>
+              <a:t> </a:t>
+            </a:r>
+          </a:p>
+          <a:p>
+            <a:pPr marL="342900" indent="-342900">
+              <a:buFont typeface="Arial" panose="020B0604020202020204" pitchFamily="34" charset="0"/>
+              <a:buChar char="•"/>
+            </a:pPr>
+            <a:r>
+              <a:rPr lang="de-AT" dirty="0" smtClean="0"/>
+              <a:t>Umsatz € 60 Millionen</a:t>
+            </a:r>
+          </a:p>
+          <a:p>
+            <a:pPr marL="342900" indent="-342900">
+              <a:buFont typeface="Arial" panose="020B0604020202020204" pitchFamily="34" charset="0"/>
+              <a:buChar char="•"/>
+            </a:pPr>
+            <a:endParaRPr lang="de-AT" dirty="0" smtClean="0"/>
+          </a:p>
+          <a:p>
+            <a:pPr marL="342900" indent="-342900">
+              <a:buFont typeface="Arial" panose="020B0604020202020204" pitchFamily="34" charset="0"/>
+              <a:buChar char="•"/>
+            </a:pPr>
+            <a:endParaRPr lang="de-AT" dirty="0" smtClean="0"/>
+          </a:p>
+          <a:p>
+            <a:pPr>
+              <a:buFont typeface="Wingdings" pitchFamily="2" charset="2"/>
+              <a:buChar char="§"/>
+            </a:pPr>
+            <a:endParaRPr lang="de-AT" dirty="0" smtClean="0"/>
+          </a:p>
+          <a:p>
+            <a:endParaRPr lang="de-AT" dirty="0" smtClean="0"/>
+          </a:p>
+        </p:txBody>
+      </p:sp>
+      <p:pic>
+        <p:nvPicPr>
+          <p:cNvPr id="6" name="Picture 2" descr="http://www.sdw2014.com/creo_files/default/austria_card.jpg"/>
+          <p:cNvPicPr>
+            <a:picLocks noChangeAspect="1" noChangeArrowheads="1"/>
+          </p:cNvPicPr>
+          <p:nvPr/>
+        </p:nvPicPr>
+        <p:blipFill>
+          <a:blip r:embed="rId3">
+            <a:extLst>
+              <a:ext uri="{28A0092B-C50C-407E-A947-70E740481C1C}">
+                <a14:useLocalDpi xmlns:a14="http://schemas.microsoft.com/office/drawing/2010/main" val="0"/>
+              </a:ext>
+            </a:extLst>
+          </a:blip>
+          <a:srcRect/>
+          <a:stretch>
+            <a:fillRect/>
+          </a:stretch>
+        </p:blipFill>
+        <p:spPr bwMode="auto">
+          <a:xfrm>
+            <a:off x="4572000" y="1169363"/>
+            <a:ext cx="4104456" cy="949685"/>
+          </a:xfrm>
+          <a:prstGeom prst="rect">
+            <a:avLst/>
+          </a:prstGeom>
+          <a:noFill/>
+          <a:extLst>
+            <a:ext uri="{909E8E84-426E-40DD-AFC4-6F175D3DCCD1}">
+              <a14:hiddenFill xmlns:a14="http://schemas.microsoft.com/office/drawing/2010/main">
+                <a:solidFill>
+                  <a:srgbClr val="FFFFFF"/>
+                </a:solidFill>
+              </a14:hiddenFill>
+            </a:ext>
+          </a:extLst>
+        </p:spPr>
+      </p:pic>
+    </p:spTree>
+    <p:extLst>
+      <p:ext uri="{BB962C8B-B14F-4D97-AF65-F5344CB8AC3E}">
+        <p14:creationId xmlns:p14="http://schemas.microsoft.com/office/powerpoint/2010/main" val="1545636436"/>
+      </p:ext>
+    </p:extLst>
   </p:cSld>
   <p:clrMapOvr>
     <a:masterClrMapping/>

</xml_diff>